<commit_message>
Fix layout for smaller screens; updated presentation
</commit_message>
<xml_diff>
--- a/portfolio.pptx
+++ b/portfolio.pptx
@@ -8,6 +8,8 @@
     <p:sldId id="256" r:id="rId2"/>
     <p:sldId id="257" r:id="rId3"/>
     <p:sldId id="258" r:id="rId4"/>
+    <p:sldId id="259" r:id="rId5"/>
+    <p:sldId id="260" r:id="rId6"/>
   </p:sldIdLst>
   <p:sldSz cx="12192000" cy="6858000"/>
   <p:notesSz cx="6858000" cy="9144000"/>
@@ -6051,15 +6053,20 @@
           </a:p>
           <a:p>
             <a:r>
-              <a:rPr lang="nl-BE" sz="4000"/>
+              <a:rPr lang="nl-BE" sz="4000" dirty="0"/>
               <a:t>Perfecte werking</a:t>
             </a:r>
-            <a:endParaRPr lang="nl-BE" sz="4000" dirty="0"/>
           </a:p>
           <a:p>
             <a:r>
               <a:rPr lang="nl-BE" sz="4000" dirty="0"/>
               <a:t>Volledig af</a:t>
+            </a:r>
+          </a:p>
+          <a:p>
+            <a:r>
+              <a:rPr lang="nl-BE" sz="4000" dirty="0"/>
+              <a:t>Uitdaging</a:t>
             </a:r>
           </a:p>
         </p:txBody>
@@ -6068,6 +6075,261 @@
     <p:extLst>
       <p:ext uri="{BB962C8B-B14F-4D97-AF65-F5344CB8AC3E}">
         <p14:creationId xmlns:p14="http://schemas.microsoft.com/office/powerpoint/2010/main" val="1268940383"/>
+      </p:ext>
+    </p:extLst>
+  </p:cSld>
+  <p:clrMapOvr>
+    <a:masterClrMapping/>
+  </p:clrMapOvr>
+</p:sld>
+</file>
+
+<file path=ppt/slides/slide4.xml><?xml version="1.0" encoding="utf-8"?>
+<p:sld xmlns:a="http://schemas.openxmlformats.org/drawingml/2006/main" xmlns:r="http://schemas.openxmlformats.org/officeDocument/2006/relationships" xmlns:p="http://schemas.openxmlformats.org/presentationml/2006/main">
+  <p:cSld>
+    <p:spTree>
+      <p:nvGrpSpPr>
+        <p:cNvPr id="1" name="">
+          <a:extLst>
+            <a:ext uri="{FF2B5EF4-FFF2-40B4-BE49-F238E27FC236}">
+              <a16:creationId xmlns:a16="http://schemas.microsoft.com/office/drawing/2014/main" id="{FF502205-6735-23F9-7941-39AE6CEB83F4}"/>
+            </a:ext>
+          </a:extLst>
+        </p:cNvPr>
+        <p:cNvGrpSpPr/>
+        <p:nvPr/>
+      </p:nvGrpSpPr>
+      <p:grpSpPr>
+        <a:xfrm>
+          <a:off x="0" y="0"/>
+          <a:ext cx="0" cy="0"/>
+          <a:chOff x="0" y="0"/>
+          <a:chExt cx="0" cy="0"/>
+        </a:xfrm>
+      </p:grpSpPr>
+      <p:sp>
+        <p:nvSpPr>
+          <p:cNvPr id="2" name="Titel 1">
+            <a:extLst>
+              <a:ext uri="{FF2B5EF4-FFF2-40B4-BE49-F238E27FC236}">
+                <a16:creationId xmlns:a16="http://schemas.microsoft.com/office/drawing/2014/main" id="{BB108A30-8AC0-D0F1-3F41-6596911D0E06}"/>
+              </a:ext>
+            </a:extLst>
+          </p:cNvPr>
+          <p:cNvSpPr>
+            <a:spLocks noGrp="1"/>
+          </p:cNvSpPr>
+          <p:nvPr>
+            <p:ph type="title"/>
+          </p:nvPr>
+        </p:nvSpPr>
+        <p:spPr/>
+        <p:txBody>
+          <a:bodyPr/>
+          <a:lstStyle/>
+          <a:p>
+            <a:r>
+              <a:rPr lang="nl-BE" dirty="0"/>
+              <a:t>Technische opbouw</a:t>
+            </a:r>
+          </a:p>
+        </p:txBody>
+      </p:sp>
+      <p:sp>
+        <p:nvSpPr>
+          <p:cNvPr id="3" name="Tijdelijke aanduiding voor inhoud 2">
+            <a:extLst>
+              <a:ext uri="{FF2B5EF4-FFF2-40B4-BE49-F238E27FC236}">
+                <a16:creationId xmlns:a16="http://schemas.microsoft.com/office/drawing/2014/main" id="{932BB770-E913-C142-F0DF-D8B4628F0C2B}"/>
+              </a:ext>
+            </a:extLst>
+          </p:cNvPr>
+          <p:cNvSpPr>
+            <a:spLocks noGrp="1"/>
+          </p:cNvSpPr>
+          <p:nvPr>
+            <p:ph idx="1"/>
+          </p:nvPr>
+        </p:nvSpPr>
+        <p:spPr/>
+        <p:txBody>
+          <a:bodyPr>
+            <a:normAutofit/>
+          </a:bodyPr>
+          <a:lstStyle/>
+          <a:p>
+            <a:r>
+              <a:rPr lang="nl-BE" sz="4000" dirty="0"/>
+              <a:t>HTML CSS Javascript</a:t>
+            </a:r>
+          </a:p>
+          <a:p>
+            <a:r>
+              <a:rPr lang="nl-BE" sz="4000" dirty="0"/>
+              <a:t>Bootstrap</a:t>
+            </a:r>
+          </a:p>
+          <a:p>
+            <a:pPr lvl="1"/>
+            <a:r>
+              <a:rPr lang="nl-BE" sz="3800" dirty="0"/>
+              <a:t>Bootstrap template</a:t>
+            </a:r>
+          </a:p>
+          <a:p>
+            <a:r>
+              <a:rPr lang="nl-BE" sz="4000" dirty="0" err="1"/>
+              <a:t>LeafletJS</a:t>
+            </a:r>
+            <a:endParaRPr lang="nl-BE" sz="4000" dirty="0"/>
+          </a:p>
+          <a:p>
+            <a:r>
+              <a:rPr lang="nl-BE" sz="4000" dirty="0"/>
+              <a:t>Aanpassingen</a:t>
+            </a:r>
+          </a:p>
+        </p:txBody>
+      </p:sp>
+    </p:spTree>
+    <p:extLst>
+      <p:ext uri="{BB962C8B-B14F-4D97-AF65-F5344CB8AC3E}">
+        <p14:creationId xmlns:p14="http://schemas.microsoft.com/office/powerpoint/2010/main" val="3625131578"/>
+      </p:ext>
+    </p:extLst>
+  </p:cSld>
+  <p:clrMapOvr>
+    <a:masterClrMapping/>
+  </p:clrMapOvr>
+</p:sld>
+</file>
+
+<file path=ppt/slides/slide5.xml><?xml version="1.0" encoding="utf-8"?>
+<p:sld xmlns:a="http://schemas.openxmlformats.org/drawingml/2006/main" xmlns:r="http://schemas.openxmlformats.org/officeDocument/2006/relationships" xmlns:p="http://schemas.openxmlformats.org/presentationml/2006/main">
+  <p:cSld>
+    <p:spTree>
+      <p:nvGrpSpPr>
+        <p:cNvPr id="1" name=""/>
+        <p:cNvGrpSpPr/>
+        <p:nvPr/>
+      </p:nvGrpSpPr>
+      <p:grpSpPr>
+        <a:xfrm>
+          <a:off x="0" y="0"/>
+          <a:ext cx="0" cy="0"/>
+          <a:chOff x="0" y="0"/>
+          <a:chExt cx="0" cy="0"/>
+        </a:xfrm>
+      </p:grpSpPr>
+      <p:sp>
+        <p:nvSpPr>
+          <p:cNvPr id="2" name="Titel 1">
+            <a:extLst>
+              <a:ext uri="{FF2B5EF4-FFF2-40B4-BE49-F238E27FC236}">
+                <a16:creationId xmlns:a16="http://schemas.microsoft.com/office/drawing/2014/main" id="{EBB7E5B3-0DE5-D38F-4A52-FD61DD1F8D97}"/>
+              </a:ext>
+            </a:extLst>
+          </p:cNvPr>
+          <p:cNvSpPr>
+            <a:spLocks noGrp="1"/>
+          </p:cNvSpPr>
+          <p:nvPr>
+            <p:ph type="title"/>
+          </p:nvPr>
+        </p:nvSpPr>
+        <p:spPr/>
+        <p:txBody>
+          <a:bodyPr/>
+          <a:lstStyle/>
+          <a:p>
+            <a:r>
+              <a:rPr lang="nl-BE" dirty="0"/>
+              <a:t>Aanpassingen</a:t>
+            </a:r>
+          </a:p>
+        </p:txBody>
+      </p:sp>
+      <p:sp>
+        <p:nvSpPr>
+          <p:cNvPr id="3" name="Tijdelijke aanduiding voor inhoud 2">
+            <a:extLst>
+              <a:ext uri="{FF2B5EF4-FFF2-40B4-BE49-F238E27FC236}">
+                <a16:creationId xmlns:a16="http://schemas.microsoft.com/office/drawing/2014/main" id="{90299E13-8E01-EFA3-5859-EBF4DBE672CB}"/>
+              </a:ext>
+            </a:extLst>
+          </p:cNvPr>
+          <p:cNvSpPr>
+            <a:spLocks noGrp="1"/>
+          </p:cNvSpPr>
+          <p:nvPr>
+            <p:ph idx="1"/>
+          </p:nvPr>
+        </p:nvSpPr>
+        <p:spPr/>
+        <p:txBody>
+          <a:bodyPr>
+            <a:normAutofit/>
+          </a:bodyPr>
+          <a:lstStyle/>
+          <a:p>
+            <a:r>
+              <a:rPr lang="nl-BE" sz="3600" dirty="0"/>
+              <a:t>CSS: overschrijven bootstrap template</a:t>
+            </a:r>
+          </a:p>
+          <a:p>
+            <a:pPr lvl="1"/>
+            <a:r>
+              <a:rPr lang="nl-BE" sz="3600" dirty="0"/>
+              <a:t>Kleurthema </a:t>
+            </a:r>
+          </a:p>
+          <a:p>
+            <a:pPr lvl="1"/>
+            <a:r>
+              <a:rPr lang="nl-BE" sz="3600" dirty="0"/>
+              <a:t>Look </a:t>
+            </a:r>
+            <a:r>
+              <a:rPr lang="nl-BE" sz="3600" dirty="0" err="1"/>
+              <a:t>and</a:t>
+            </a:r>
+            <a:r>
+              <a:rPr lang="nl-BE" sz="3600" dirty="0"/>
+              <a:t> feel aanpassingen</a:t>
+            </a:r>
+          </a:p>
+          <a:p>
+            <a:r>
+              <a:rPr lang="nl-BE" sz="3600" dirty="0"/>
+              <a:t>JS: </a:t>
+            </a:r>
+            <a:r>
+              <a:rPr lang="nl-BE" sz="3600" dirty="0" err="1"/>
+              <a:t>intergreren</a:t>
+            </a:r>
+            <a:r>
+              <a:rPr lang="nl-BE" sz="3600" dirty="0"/>
+              <a:t> </a:t>
+            </a:r>
+            <a:r>
+              <a:rPr lang="nl-BE" sz="3600" dirty="0" err="1"/>
+              <a:t>LeafletJS</a:t>
+            </a:r>
+            <a:endParaRPr lang="nl-BE" sz="3600" dirty="0"/>
+          </a:p>
+          <a:p>
+            <a:r>
+              <a:rPr lang="nl-BE" sz="3600" dirty="0"/>
+              <a:t>Logo’s en afbeeldingen</a:t>
+            </a:r>
+          </a:p>
+        </p:txBody>
+      </p:sp>
+    </p:spTree>
+    <p:extLst>
+      <p:ext uri="{BB962C8B-B14F-4D97-AF65-F5344CB8AC3E}">
+        <p14:creationId xmlns:p14="http://schemas.microsoft.com/office/powerpoint/2010/main" val="4226739333"/>
       </p:ext>
     </p:extLst>
   </p:cSld>

</xml_diff>